<commit_message>
updated lots of visualizations; added cross-task generalization code
</commit_message>
<xml_diff>
--- a/misc/visualizations.pptx
+++ b/misc/visualizations.pptx
@@ -6,9 +6,7 @@
   </p:sldMasterIdLst>
   <p:sldIdLst>
     <p:sldId id="256" r:id="rId2"/>
-    <p:sldId id="257" r:id="rId3"/>
-    <p:sldId id="259" r:id="rId4"/>
-    <p:sldId id="258" r:id="rId5"/>
+    <p:sldId id="260" r:id="rId3"/>
   </p:sldIdLst>
   <p:sldSz cx="12192000" cy="6858000"/>
   <p:notesSz cx="6858000" cy="9144000"/>
@@ -3329,35 +3327,347 @@
           <a:chExt cx="0" cy="0"/>
         </a:xfrm>
       </p:grpSpPr>
-      <p:pic>
-        <p:nvPicPr>
-          <p:cNvPr id="5" name="Picture 4" descr="A map of a city&#10;&#10;AI-generated content may be incorrect.">
-            <a:extLst>
-              <a:ext uri="{FF2B5EF4-FFF2-40B4-BE49-F238E27FC236}">
-                <a16:creationId xmlns:a16="http://schemas.microsoft.com/office/drawing/2014/main" id="{9EEA0F1F-0CD0-21DF-BBF0-76D62F737C70}"/>
-              </a:ext>
-            </a:extLst>
-          </p:cNvPr>
-          <p:cNvPicPr>
-            <a:picLocks noChangeAspect="1"/>
-          </p:cNvPicPr>
+      <p:grpSp>
+        <p:nvGrpSpPr>
+          <p:cNvPr id="3" name="Group 2">
+            <a:extLst>
+              <a:ext uri="{FF2B5EF4-FFF2-40B4-BE49-F238E27FC236}">
+                <a16:creationId xmlns:a16="http://schemas.microsoft.com/office/drawing/2014/main" id="{74018074-362F-4A86-04F3-538B1225D168}"/>
+              </a:ext>
+            </a:extLst>
+          </p:cNvPr>
+          <p:cNvGrpSpPr/>
           <p:nvPr/>
-        </p:nvPicPr>
-        <p:blipFill>
-          <a:blip r:embed="rId2"/>
-          <a:srcRect l="33059" t="15372" r="33647" b="17569"/>
-          <a:stretch/>
-        </p:blipFill>
-        <p:spPr>
+        </p:nvGrpSpPr>
+        <p:grpSpPr>
           <a:xfrm>
-            <a:off x="3090672" y="1755648"/>
-            <a:ext cx="2587752" cy="2606040"/>
+            <a:off x="766919" y="1169522"/>
+            <a:ext cx="3631934" cy="4273157"/>
+            <a:chOff x="766919" y="1169522"/>
+            <a:chExt cx="3631934" cy="4273157"/>
           </a:xfrm>
-          <a:prstGeom prst="rect">
-            <a:avLst/>
-          </a:prstGeom>
-        </p:spPr>
-      </p:pic>
+        </p:grpSpPr>
+        <p:pic>
+          <p:nvPicPr>
+            <p:cNvPr id="5" name="Picture 4" descr="A map of a city&#10;&#10;AI-generated content may be incorrect.">
+              <a:extLst>
+                <a:ext uri="{FF2B5EF4-FFF2-40B4-BE49-F238E27FC236}">
+                  <a16:creationId xmlns:a16="http://schemas.microsoft.com/office/drawing/2014/main" id="{9EEA0F1F-0CD0-21DF-BBF0-76D62F737C70}"/>
+                </a:ext>
+              </a:extLst>
+            </p:cNvPr>
+            <p:cNvPicPr>
+              <a:picLocks noChangeAspect="1"/>
+            </p:cNvPicPr>
+            <p:nvPr/>
+          </p:nvPicPr>
+          <p:blipFill>
+            <a:blip r:embed="rId2"/>
+            <a:srcRect l="33059" t="15372" r="33647" b="17569"/>
+            <a:stretch/>
+          </p:blipFill>
+          <p:spPr>
+            <a:xfrm>
+              <a:off x="766921" y="1477301"/>
+              <a:ext cx="1815966" cy="1828800"/>
+            </a:xfrm>
+            <a:prstGeom prst="rect">
+              <a:avLst/>
+            </a:prstGeom>
+          </p:spPr>
+        </p:pic>
+        <p:pic>
+          <p:nvPicPr>
+            <p:cNvPr id="2" name="Picture 1" descr="A map of a city&#10;&#10;AI-generated content may be incorrect.">
+              <a:extLst>
+                <a:ext uri="{FF2B5EF4-FFF2-40B4-BE49-F238E27FC236}">
+                  <a16:creationId xmlns:a16="http://schemas.microsoft.com/office/drawing/2014/main" id="{D5B9ED48-588D-017C-FF15-41A31E2E01DD}"/>
+                </a:ext>
+              </a:extLst>
+            </p:cNvPr>
+            <p:cNvPicPr>
+              <a:picLocks noChangeAspect="1"/>
+            </p:cNvPicPr>
+            <p:nvPr/>
+          </p:nvPicPr>
+          <p:blipFill>
+            <a:blip r:embed="rId3"/>
+            <a:srcRect l="29118" t="16470" r="37588" b="16470"/>
+            <a:stretch/>
+          </p:blipFill>
+          <p:spPr>
+            <a:xfrm>
+              <a:off x="2582887" y="1477301"/>
+              <a:ext cx="1815966" cy="1828800"/>
+            </a:xfrm>
+            <a:prstGeom prst="rect">
+              <a:avLst/>
+            </a:prstGeom>
+          </p:spPr>
+        </p:pic>
+        <p:pic>
+          <p:nvPicPr>
+            <p:cNvPr id="4" name="Picture 3" descr="A map of a city&#10;&#10;AI-generated content may be incorrect.">
+              <a:extLst>
+                <a:ext uri="{FF2B5EF4-FFF2-40B4-BE49-F238E27FC236}">
+                  <a16:creationId xmlns:a16="http://schemas.microsoft.com/office/drawing/2014/main" id="{D0D97044-5249-B11C-EFD9-FF6365C364A1}"/>
+                </a:ext>
+              </a:extLst>
+            </p:cNvPr>
+            <p:cNvPicPr>
+              <a:picLocks noChangeAspect="1"/>
+            </p:cNvPicPr>
+            <p:nvPr/>
+          </p:nvPicPr>
+          <p:blipFill>
+            <a:blip r:embed="rId4"/>
+            <a:srcRect l="31059" t="13979" r="35647" b="18961"/>
+            <a:stretch/>
+          </p:blipFill>
+          <p:spPr>
+            <a:xfrm>
+              <a:off x="2582885" y="3613878"/>
+              <a:ext cx="1815966" cy="1828800"/>
+            </a:xfrm>
+            <a:prstGeom prst="rect">
+              <a:avLst/>
+            </a:prstGeom>
+          </p:spPr>
+        </p:pic>
+        <p:pic>
+          <p:nvPicPr>
+            <p:cNvPr id="6" name="Picture 5" descr="A map of a city&#10;&#10;AI-generated content may be incorrect.">
+              <a:extLst>
+                <a:ext uri="{FF2B5EF4-FFF2-40B4-BE49-F238E27FC236}">
+                  <a16:creationId xmlns:a16="http://schemas.microsoft.com/office/drawing/2014/main" id="{D4A7370B-9132-AB60-DDF4-7F9953E96985}"/>
+                </a:ext>
+              </a:extLst>
+            </p:cNvPr>
+            <p:cNvPicPr>
+              <a:picLocks noChangeAspect="1"/>
+            </p:cNvPicPr>
+            <p:nvPr/>
+          </p:nvPicPr>
+          <p:blipFill>
+            <a:blip r:embed="rId5"/>
+            <a:srcRect l="33467" t="16471" r="33239" b="16471"/>
+            <a:stretch/>
+          </p:blipFill>
+          <p:spPr>
+            <a:xfrm>
+              <a:off x="766919" y="3613879"/>
+              <a:ext cx="1815966" cy="1828800"/>
+            </a:xfrm>
+            <a:prstGeom prst="rect">
+              <a:avLst/>
+            </a:prstGeom>
+          </p:spPr>
+        </p:pic>
+        <p:sp>
+          <p:nvSpPr>
+            <p:cNvPr id="8" name="TextBox 7">
+              <a:extLst>
+                <a:ext uri="{FF2B5EF4-FFF2-40B4-BE49-F238E27FC236}">
+                  <a16:creationId xmlns:a16="http://schemas.microsoft.com/office/drawing/2014/main" id="{379430F3-17BB-E617-255F-C6565780AAF2}"/>
+                </a:ext>
+              </a:extLst>
+            </p:cNvPr>
+            <p:cNvSpPr txBox="1"/>
+            <p:nvPr/>
+          </p:nvSpPr>
+          <p:spPr>
+            <a:xfrm>
+              <a:off x="766922" y="1169522"/>
+              <a:ext cx="1815964" cy="307777"/>
+            </a:xfrm>
+            <a:prstGeom prst="rect">
+              <a:avLst/>
+            </a:prstGeom>
+            <a:solidFill>
+              <a:schemeClr val="bg1">
+                <a:lumMod val="95000"/>
+              </a:schemeClr>
+            </a:solidFill>
+          </p:spPr>
+          <p:txBody>
+            <a:bodyPr wrap="square" rtlCol="0">
+              <a:spAutoFit/>
+            </a:bodyPr>
+            <a:lstStyle/>
+            <a:p>
+              <a:pPr algn="ctr"/>
+              <a:r>
+                <a:rPr lang="en-US" sz="1400" b="1" dirty="0">
+                  <a:solidFill>
+                    <a:schemeClr val="accent3"/>
+                  </a:solidFill>
+                  <a:latin typeface="Chalkboard SE Light" panose="03050602040202020205" pitchFamily="66" charset="77"/>
+                </a:rPr>
+                <a:t>Positive</a:t>
+              </a:r>
+              <a:r>
+                <a:rPr lang="en-US" sz="1400" dirty="0">
+                  <a:latin typeface="Chalkboard SE Light" panose="03050602040202020205" pitchFamily="66" charset="77"/>
+                </a:rPr>
+                <a:t> Join Pair</a:t>
+              </a:r>
+            </a:p>
+          </p:txBody>
+        </p:sp>
+        <p:sp>
+          <p:nvSpPr>
+            <p:cNvPr id="13" name="TextBox 12">
+              <a:extLst>
+                <a:ext uri="{FF2B5EF4-FFF2-40B4-BE49-F238E27FC236}">
+                  <a16:creationId xmlns:a16="http://schemas.microsoft.com/office/drawing/2014/main" id="{70456906-D0FE-1222-A985-89D872219DB7}"/>
+                </a:ext>
+              </a:extLst>
+            </p:cNvPr>
+            <p:cNvSpPr txBox="1"/>
+            <p:nvPr/>
+          </p:nvSpPr>
+          <p:spPr>
+            <a:xfrm>
+              <a:off x="2582889" y="1169522"/>
+              <a:ext cx="1815964" cy="307777"/>
+            </a:xfrm>
+            <a:prstGeom prst="rect">
+              <a:avLst/>
+            </a:prstGeom>
+            <a:solidFill>
+              <a:schemeClr val="bg1">
+                <a:lumMod val="95000"/>
+              </a:schemeClr>
+            </a:solidFill>
+          </p:spPr>
+          <p:txBody>
+            <a:bodyPr wrap="square" rtlCol="0">
+              <a:spAutoFit/>
+            </a:bodyPr>
+            <a:lstStyle/>
+            <a:p>
+              <a:pPr algn="ctr"/>
+              <a:r>
+                <a:rPr lang="en-US" sz="1400" b="1" dirty="0">
+                  <a:solidFill>
+                    <a:srgbClr val="FF0000"/>
+                  </a:solidFill>
+                  <a:latin typeface="Chalkboard SE Light" panose="03050602040202020205" pitchFamily="66" charset="77"/>
+                </a:rPr>
+                <a:t>Negative</a:t>
+              </a:r>
+              <a:r>
+                <a:rPr lang="en-US" sz="1400" dirty="0">
+                  <a:latin typeface="Chalkboard SE Light" panose="03050602040202020205" pitchFamily="66" charset="77"/>
+                </a:rPr>
+                <a:t> Join Pair</a:t>
+              </a:r>
+            </a:p>
+          </p:txBody>
+        </p:sp>
+        <p:sp>
+          <p:nvSpPr>
+            <p:cNvPr id="17" name="TextBox 16">
+              <a:extLst>
+                <a:ext uri="{FF2B5EF4-FFF2-40B4-BE49-F238E27FC236}">
+                  <a16:creationId xmlns:a16="http://schemas.microsoft.com/office/drawing/2014/main" id="{05573CBB-800B-C91F-F612-33F43617213F}"/>
+                </a:ext>
+              </a:extLst>
+            </p:cNvPr>
+            <p:cNvSpPr txBox="1"/>
+            <p:nvPr/>
+          </p:nvSpPr>
+          <p:spPr>
+            <a:xfrm>
+              <a:off x="766922" y="3306101"/>
+              <a:ext cx="1815964" cy="307777"/>
+            </a:xfrm>
+            <a:prstGeom prst="rect">
+              <a:avLst/>
+            </a:prstGeom>
+            <a:solidFill>
+              <a:schemeClr val="bg1">
+                <a:lumMod val="95000"/>
+              </a:schemeClr>
+            </a:solidFill>
+          </p:spPr>
+          <p:txBody>
+            <a:bodyPr wrap="square" rtlCol="0">
+              <a:spAutoFit/>
+            </a:bodyPr>
+            <a:lstStyle/>
+            <a:p>
+              <a:pPr algn="ctr"/>
+              <a:r>
+                <a:rPr lang="en-US" sz="1400" b="1" dirty="0">
+                  <a:solidFill>
+                    <a:schemeClr val="accent3"/>
+                  </a:solidFill>
+                  <a:latin typeface="Chalkboard SE Light" panose="03050602040202020205" pitchFamily="66" charset="77"/>
+                </a:rPr>
+                <a:t>Positive</a:t>
+              </a:r>
+              <a:r>
+                <a:rPr lang="en-US" sz="1400" dirty="0">
+                  <a:latin typeface="Chalkboard SE Light" panose="03050602040202020205" pitchFamily="66" charset="77"/>
+                </a:rPr>
+                <a:t> Union Pair</a:t>
+              </a:r>
+            </a:p>
+          </p:txBody>
+        </p:sp>
+        <p:sp>
+          <p:nvSpPr>
+            <p:cNvPr id="18" name="TextBox 17">
+              <a:extLst>
+                <a:ext uri="{FF2B5EF4-FFF2-40B4-BE49-F238E27FC236}">
+                  <a16:creationId xmlns:a16="http://schemas.microsoft.com/office/drawing/2014/main" id="{1AFD5EA2-1E1A-390E-1D6F-A1146B42E3EB}"/>
+                </a:ext>
+              </a:extLst>
+            </p:cNvPr>
+            <p:cNvSpPr txBox="1"/>
+            <p:nvPr/>
+          </p:nvSpPr>
+          <p:spPr>
+            <a:xfrm>
+              <a:off x="2582889" y="3306101"/>
+              <a:ext cx="1815964" cy="307777"/>
+            </a:xfrm>
+            <a:prstGeom prst="rect">
+              <a:avLst/>
+            </a:prstGeom>
+            <a:solidFill>
+              <a:schemeClr val="bg1">
+                <a:lumMod val="95000"/>
+              </a:schemeClr>
+            </a:solidFill>
+          </p:spPr>
+          <p:txBody>
+            <a:bodyPr wrap="square" rtlCol="0">
+              <a:spAutoFit/>
+            </a:bodyPr>
+            <a:lstStyle/>
+            <a:p>
+              <a:pPr algn="ctr"/>
+              <a:r>
+                <a:rPr lang="en-US" sz="1400" b="1" dirty="0">
+                  <a:solidFill>
+                    <a:srgbClr val="FF0000"/>
+                  </a:solidFill>
+                  <a:latin typeface="Chalkboard SE Light" panose="03050602040202020205" pitchFamily="66" charset="77"/>
+                </a:rPr>
+                <a:t>Negative</a:t>
+              </a:r>
+              <a:r>
+                <a:rPr lang="en-US" sz="1400" dirty="0">
+                  <a:latin typeface="Chalkboard SE Light" panose="03050602040202020205" pitchFamily="66" charset="77"/>
+                </a:rPr>
+                <a:t> Union Pair</a:t>
+              </a:r>
+            </a:p>
+          </p:txBody>
+        </p:sp>
+      </p:grpSp>
     </p:spTree>
     <p:extLst>
       <p:ext uri="{BB962C8B-B14F-4D97-AF65-F5344CB8AC3E}">
@@ -3376,13 +3686,7 @@
   <p:cSld>
     <p:spTree>
       <p:nvGrpSpPr>
-        <p:cNvPr id="1" name="">
-          <a:extLst>
-            <a:ext uri="{FF2B5EF4-FFF2-40B4-BE49-F238E27FC236}">
-              <a16:creationId xmlns:a16="http://schemas.microsoft.com/office/drawing/2014/main" id="{A6C75EEB-6BF1-A388-3B79-733A5D3F230F}"/>
-            </a:ext>
-          </a:extLst>
-        </p:cNvPr>
+        <p:cNvPr id="1" name=""/>
         <p:cNvGrpSpPr/>
         <p:nvPr/>
       </p:nvGrpSpPr>
@@ -3394,169 +3698,390 @@
           <a:chExt cx="0" cy="0"/>
         </a:xfrm>
       </p:grpSpPr>
-      <p:pic>
-        <p:nvPicPr>
-          <p:cNvPr id="7" name="Picture 6" descr="A map of a city&#10;&#10;AI-generated content may be incorrect.">
-            <a:extLst>
-              <a:ext uri="{FF2B5EF4-FFF2-40B4-BE49-F238E27FC236}">
-                <a16:creationId xmlns:a16="http://schemas.microsoft.com/office/drawing/2014/main" id="{7745C109-B578-CDBA-3F39-C6F262A9E602}"/>
-              </a:ext>
-            </a:extLst>
-          </p:cNvPr>
-          <p:cNvPicPr>
-            <a:picLocks noChangeAspect="1"/>
-          </p:cNvPicPr>
+      <p:grpSp>
+        <p:nvGrpSpPr>
+          <p:cNvPr id="4" name="Group 3">
+            <a:extLst>
+              <a:ext uri="{FF2B5EF4-FFF2-40B4-BE49-F238E27FC236}">
+                <a16:creationId xmlns:a16="http://schemas.microsoft.com/office/drawing/2014/main" id="{391235F0-0A4A-CDD4-C04E-455C458B0990}"/>
+              </a:ext>
+            </a:extLst>
+          </p:cNvPr>
+          <p:cNvGrpSpPr/>
           <p:nvPr/>
-        </p:nvPicPr>
-        <p:blipFill>
-          <a:blip r:embed="rId2"/>
-          <a:srcRect l="29118" t="16470" r="37588" b="16470"/>
-          <a:stretch/>
-        </p:blipFill>
-        <p:spPr>
+        </p:nvGrpSpPr>
+        <p:grpSpPr>
           <a:xfrm>
-            <a:off x="7141464" y="1655064"/>
-            <a:ext cx="2587752" cy="2606040"/>
+            <a:off x="1395642" y="1063823"/>
+            <a:ext cx="3394472" cy="3546764"/>
+            <a:chOff x="1395642" y="1063823"/>
+            <a:chExt cx="3394472" cy="3546764"/>
           </a:xfrm>
-          <a:prstGeom prst="rect">
-            <a:avLst/>
-          </a:prstGeom>
-        </p:spPr>
-      </p:pic>
+        </p:grpSpPr>
+        <p:sp>
+          <p:nvSpPr>
+            <p:cNvPr id="7" name="TextBox 6">
+              <a:extLst>
+                <a:ext uri="{FF2B5EF4-FFF2-40B4-BE49-F238E27FC236}">
+                  <a16:creationId xmlns:a16="http://schemas.microsoft.com/office/drawing/2014/main" id="{413E0CE6-F1FD-13EF-B892-B65F0BBB4E12}"/>
+                </a:ext>
+              </a:extLst>
+            </p:cNvPr>
+            <p:cNvSpPr txBox="1"/>
+            <p:nvPr/>
+          </p:nvSpPr>
+          <p:spPr>
+            <a:xfrm>
+              <a:off x="1395659" y="1371419"/>
+              <a:ext cx="3394455" cy="1223412"/>
+            </a:xfrm>
+            <a:prstGeom prst="rect">
+              <a:avLst/>
+            </a:prstGeom>
+            <a:solidFill>
+              <a:schemeClr val="bg1">
+                <a:lumMod val="95000"/>
+              </a:schemeClr>
+            </a:solidFill>
+          </p:spPr>
+          <p:txBody>
+            <a:bodyPr wrap="square" rtlCol="0">
+              <a:spAutoFit/>
+            </a:bodyPr>
+            <a:lstStyle/>
+            <a:p>
+              <a:r>
+                <a:rPr lang="en-US" sz="1050" i="1" dirty="0"/>
+                <a:t>### Instruction: </a:t>
+              </a:r>
+              <a:r>
+                <a:rPr lang="en-US" sz="1050" dirty="0"/>
+                <a:t>{}</a:t>
+              </a:r>
+            </a:p>
+            <a:p>
+              <a:endParaRPr lang="en-US" sz="1050" dirty="0"/>
+            </a:p>
+            <a:p>
+              <a:r>
+                <a:rPr lang="en-US" sz="1050" i="1" dirty="0"/>
+                <a:t>### User:</a:t>
+              </a:r>
+            </a:p>
+            <a:p>
+              <a:r>
+                <a:rPr lang="en-US" sz="1050" dirty="0"/>
+                <a:t>Sidewalk: {'coordinates': [[-122.2, 47.5], [-122.1, 47.5]]}</a:t>
+              </a:r>
+            </a:p>
+            <a:p>
+              <a:r>
+                <a:rPr lang="en-US" sz="1050" dirty="0"/>
+                <a:t>Road: {'coordinates': [[-122.5, 47.2],  [-122.5, 47.2]]}</a:t>
+              </a:r>
+            </a:p>
+            <a:p>
+              <a:endParaRPr lang="en-US" sz="1050" dirty="0"/>
+            </a:p>
+            <a:p>
+              <a:r>
+                <a:rPr lang="en-US" sz="1050" i="1" dirty="0"/>
+                <a:t>### Response: </a:t>
+              </a:r>
+              <a:r>
+                <a:rPr lang="en-US" sz="1050" dirty="0"/>
+                <a:t>{}</a:t>
+              </a:r>
+            </a:p>
+          </p:txBody>
+        </p:sp>
+        <p:sp>
+          <p:nvSpPr>
+            <p:cNvPr id="9" name="TextBox 8">
+              <a:extLst>
+                <a:ext uri="{FF2B5EF4-FFF2-40B4-BE49-F238E27FC236}">
+                  <a16:creationId xmlns:a16="http://schemas.microsoft.com/office/drawing/2014/main" id="{034ADD79-7746-4C3B-ACB1-09267CDDED4B}"/>
+                </a:ext>
+              </a:extLst>
+            </p:cNvPr>
+            <p:cNvSpPr txBox="1"/>
+            <p:nvPr/>
+          </p:nvSpPr>
+          <p:spPr>
+            <a:xfrm>
+              <a:off x="1395642" y="2902427"/>
+              <a:ext cx="3394452" cy="1708160"/>
+            </a:xfrm>
+            <a:prstGeom prst="rect">
+              <a:avLst/>
+            </a:prstGeom>
+            <a:solidFill>
+              <a:schemeClr val="bg1">
+                <a:lumMod val="95000"/>
+              </a:schemeClr>
+            </a:solidFill>
+          </p:spPr>
+          <p:txBody>
+            <a:bodyPr wrap="square" rtlCol="0">
+              <a:spAutoFit/>
+            </a:bodyPr>
+            <a:lstStyle/>
+            <a:p>
+              <a:r>
+                <a:rPr lang="en-US" sz="1050" i="1" dirty="0"/>
+                <a:t>### Instruction: </a:t>
+              </a:r>
+              <a:r>
+                <a:rPr lang="en-US" sz="1050" dirty="0"/>
+                <a:t>{}</a:t>
+              </a:r>
+            </a:p>
+            <a:p>
+              <a:endParaRPr lang="en-US" sz="1050" dirty="0"/>
+            </a:p>
+            <a:p>
+              <a:r>
+                <a:rPr lang="en-US" sz="1050" i="1" dirty="0"/>
+                <a:t>### User:</a:t>
+              </a:r>
+            </a:p>
+            <a:p>
+              <a:r>
+                <a:rPr lang="en-US" sz="1050" dirty="0"/>
+                <a:t>Sidewalk: {'coordinates': [[-122.2, 47.5], [-122.1, 47.5]]}</a:t>
+              </a:r>
+            </a:p>
+            <a:p>
+              <a:r>
+                <a:rPr lang="en-US" sz="1050" dirty="0"/>
+                <a:t>Road: {'coordinates': [[-122.5, 47.2],  [-122.5, 47.2]]}</a:t>
+              </a:r>
+            </a:p>
+            <a:p>
+              <a:endParaRPr lang="en-US" sz="1050" dirty="0"/>
+            </a:p>
+            <a:p>
+              <a:r>
+                <a:rPr lang="en-US" sz="1050" b="1" dirty="0">
+                  <a:solidFill>
+                    <a:schemeClr val="accent3"/>
+                  </a:solidFill>
+                </a:rPr>
+                <a:t> </a:t>
+              </a:r>
+              <a:r>
+                <a:rPr lang="en-US" sz="1050" b="1" dirty="0" err="1">
+                  <a:solidFill>
+                    <a:schemeClr val="accent3"/>
+                  </a:solidFill>
+                </a:rPr>
+                <a:t>min_angle</a:t>
+              </a:r>
+              <a:r>
+                <a:rPr lang="en-US" sz="1050" b="1" dirty="0">
+                  <a:solidFill>
+                    <a:schemeClr val="accent3"/>
+                  </a:solidFill>
+                </a:rPr>
+                <a:t>: 9.97387</a:t>
+              </a:r>
+            </a:p>
+            <a:p>
+              <a:r>
+                <a:rPr lang="en-US" sz="1050" b="1" dirty="0">
+                  <a:solidFill>
+                    <a:schemeClr val="accent3"/>
+                  </a:solidFill>
+                </a:rPr>
+                <a:t> </a:t>
+              </a:r>
+              <a:r>
+                <a:rPr lang="en-US" sz="1050" b="1" dirty="0" err="1">
+                  <a:solidFill>
+                    <a:schemeClr val="accent3"/>
+                  </a:solidFill>
+                </a:rPr>
+                <a:t>min_distance</a:t>
+              </a:r>
+              <a:r>
+                <a:rPr lang="en-US" sz="1050" b="1" dirty="0">
+                  <a:solidFill>
+                    <a:schemeClr val="accent3"/>
+                  </a:solidFill>
+                </a:rPr>
+                <a:t>: 8.72605</a:t>
+              </a:r>
+            </a:p>
+            <a:p>
+              <a:endParaRPr lang="en-US" sz="1050" b="1" dirty="0">
+                <a:solidFill>
+                  <a:schemeClr val="accent3"/>
+                </a:solidFill>
+              </a:endParaRPr>
+            </a:p>
+            <a:p>
+              <a:r>
+                <a:rPr lang="en-US" sz="1050" i="1" dirty="0"/>
+                <a:t>### Response: </a:t>
+              </a:r>
+              <a:r>
+                <a:rPr lang="en-US" sz="1050" dirty="0"/>
+                <a:t>{}</a:t>
+              </a:r>
+            </a:p>
+          </p:txBody>
+        </p:sp>
+        <p:sp>
+          <p:nvSpPr>
+            <p:cNvPr id="10" name="TextBox 9">
+              <a:extLst>
+                <a:ext uri="{FF2B5EF4-FFF2-40B4-BE49-F238E27FC236}">
+                  <a16:creationId xmlns:a16="http://schemas.microsoft.com/office/drawing/2014/main" id="{898D6A88-DF15-1E2E-7998-BAFCC7E0E041}"/>
+                </a:ext>
+              </a:extLst>
+            </p:cNvPr>
+            <p:cNvSpPr txBox="1"/>
+            <p:nvPr/>
+          </p:nvSpPr>
+          <p:spPr>
+            <a:xfrm>
+              <a:off x="1395662" y="1063823"/>
+              <a:ext cx="3394452" cy="307777"/>
+            </a:xfrm>
+            <a:prstGeom prst="rect">
+              <a:avLst/>
+            </a:prstGeom>
+            <a:solidFill>
+              <a:schemeClr val="bg1">
+                <a:lumMod val="85000"/>
+              </a:schemeClr>
+            </a:solidFill>
+          </p:spPr>
+          <p:txBody>
+            <a:bodyPr wrap="square" rtlCol="0">
+              <a:spAutoFit/>
+            </a:bodyPr>
+            <a:lstStyle/>
+            <a:p>
+              <a:pPr algn="ctr"/>
+              <a:r>
+                <a:rPr lang="en-US" sz="1400" b="1" dirty="0">
+                  <a:latin typeface="Chalkboard SE Light" panose="03050602040202020205" pitchFamily="66" charset="77"/>
+                </a:rPr>
+                <a:t>No-Heuristics Prompting</a:t>
+              </a:r>
+              <a:endParaRPr lang="en-US" sz="1400" dirty="0">
+                <a:latin typeface="Chalkboard SE Light" panose="03050602040202020205" pitchFamily="66" charset="77"/>
+              </a:endParaRPr>
+            </a:p>
+          </p:txBody>
+        </p:sp>
+        <p:sp>
+          <p:nvSpPr>
+            <p:cNvPr id="11" name="TextBox 10">
+              <a:extLst>
+                <a:ext uri="{FF2B5EF4-FFF2-40B4-BE49-F238E27FC236}">
+                  <a16:creationId xmlns:a16="http://schemas.microsoft.com/office/drawing/2014/main" id="{E478B734-A8FD-965F-5745-EAE2EF153C75}"/>
+                </a:ext>
+              </a:extLst>
+            </p:cNvPr>
+            <p:cNvSpPr txBox="1"/>
+            <p:nvPr/>
+          </p:nvSpPr>
+          <p:spPr>
+            <a:xfrm>
+              <a:off x="1395652" y="2594650"/>
+              <a:ext cx="3394452" cy="307777"/>
+            </a:xfrm>
+            <a:prstGeom prst="rect">
+              <a:avLst/>
+            </a:prstGeom>
+            <a:solidFill>
+              <a:schemeClr val="bg1">
+                <a:lumMod val="85000"/>
+              </a:schemeClr>
+            </a:solidFill>
+          </p:spPr>
+          <p:txBody>
+            <a:bodyPr wrap="square" rtlCol="0">
+              <a:spAutoFit/>
+            </a:bodyPr>
+            <a:lstStyle/>
+            <a:p>
+              <a:pPr algn="ctr"/>
+              <a:r>
+                <a:rPr lang="en-US" sz="1400" b="1" dirty="0">
+                  <a:solidFill>
+                    <a:schemeClr val="accent3"/>
+                  </a:solidFill>
+                  <a:latin typeface="Chalkboard SE Light" panose="03050602040202020205" pitchFamily="66" charset="77"/>
+                </a:rPr>
+                <a:t>With-Heuristics Prompting</a:t>
+              </a:r>
+              <a:endParaRPr lang="en-US" sz="1400" dirty="0">
+                <a:latin typeface="Chalkboard SE Light" panose="03050602040202020205" pitchFamily="66" charset="77"/>
+              </a:endParaRPr>
+            </a:p>
+          </p:txBody>
+        </p:sp>
+        <p:sp>
+          <p:nvSpPr>
+            <p:cNvPr id="2" name="Rounded Rectangle 1">
+              <a:extLst>
+                <a:ext uri="{FF2B5EF4-FFF2-40B4-BE49-F238E27FC236}">
+                  <a16:creationId xmlns:a16="http://schemas.microsoft.com/office/drawing/2014/main" id="{B6D6FD64-8EF9-0CAA-2493-AE69D2FFC835}"/>
+                </a:ext>
+              </a:extLst>
+            </p:cNvPr>
+            <p:cNvSpPr/>
+            <p:nvPr/>
+          </p:nvSpPr>
+          <p:spPr>
+            <a:xfrm>
+              <a:off x="1459685" y="3817881"/>
+              <a:ext cx="1468074" cy="469783"/>
+            </a:xfrm>
+            <a:prstGeom prst="roundRect">
+              <a:avLst/>
+            </a:prstGeom>
+            <a:noFill/>
+            <a:ln w="19050">
+              <a:solidFill>
+                <a:schemeClr val="accent3"/>
+              </a:solidFill>
+              <a:prstDash val="dash"/>
+            </a:ln>
+          </p:spPr>
+          <p:style>
+            <a:lnRef idx="2">
+              <a:schemeClr val="accent1">
+                <a:shade val="15000"/>
+              </a:schemeClr>
+            </a:lnRef>
+            <a:fillRef idx="1">
+              <a:schemeClr val="accent1"/>
+            </a:fillRef>
+            <a:effectRef idx="0">
+              <a:schemeClr val="accent1"/>
+            </a:effectRef>
+            <a:fontRef idx="minor">
+              <a:schemeClr val="lt1"/>
+            </a:fontRef>
+          </p:style>
+          <p:txBody>
+            <a:bodyPr rtlCol="0" anchor="ctr"/>
+            <a:lstStyle/>
+            <a:p>
+              <a:pPr algn="ctr"/>
+              <a:endParaRPr lang="en-US"/>
+            </a:p>
+          </p:txBody>
+        </p:sp>
+      </p:grpSp>
     </p:spTree>
     <p:extLst>
       <p:ext uri="{BB962C8B-B14F-4D97-AF65-F5344CB8AC3E}">
-        <p14:creationId xmlns:p14="http://schemas.microsoft.com/office/powerpoint/2010/main" val="970152186"/>
-      </p:ext>
-    </p:extLst>
-  </p:cSld>
-  <p:clrMapOvr>
-    <a:masterClrMapping/>
-  </p:clrMapOvr>
-</p:sld>
-</file>
-
-<file path=ppt/slides/slide3.xml><?xml version="1.0" encoding="utf-8"?>
-<p:sld xmlns:a="http://schemas.openxmlformats.org/drawingml/2006/main" xmlns:r="http://schemas.openxmlformats.org/officeDocument/2006/relationships" xmlns:p="http://schemas.openxmlformats.org/presentationml/2006/main">
-  <p:cSld>
-    <p:spTree>
-      <p:nvGrpSpPr>
-        <p:cNvPr id="1" name="">
-          <a:extLst>
-            <a:ext uri="{FF2B5EF4-FFF2-40B4-BE49-F238E27FC236}">
-              <a16:creationId xmlns:a16="http://schemas.microsoft.com/office/drawing/2014/main" id="{774035AE-ADD9-99EC-DC6A-E705123741AC}"/>
-            </a:ext>
-          </a:extLst>
-        </p:cNvPr>
-        <p:cNvGrpSpPr/>
-        <p:nvPr/>
-      </p:nvGrpSpPr>
-      <p:grpSpPr>
-        <a:xfrm>
-          <a:off x="0" y="0"/>
-          <a:ext cx="0" cy="0"/>
-          <a:chOff x="0" y="0"/>
-          <a:chExt cx="0" cy="0"/>
-        </a:xfrm>
-      </p:grpSpPr>
-      <p:pic>
-        <p:nvPicPr>
-          <p:cNvPr id="3" name="Picture 2" descr="A map of a city&#10;&#10;AI-generated content may be incorrect.">
-            <a:extLst>
-              <a:ext uri="{FF2B5EF4-FFF2-40B4-BE49-F238E27FC236}">
-                <a16:creationId xmlns:a16="http://schemas.microsoft.com/office/drawing/2014/main" id="{81297506-04B0-B6AF-1466-6EC045526EC6}"/>
-              </a:ext>
-            </a:extLst>
-          </p:cNvPr>
-          <p:cNvPicPr>
-            <a:picLocks noChangeAspect="1"/>
-          </p:cNvPicPr>
-          <p:nvPr/>
-        </p:nvPicPr>
-        <p:blipFill>
-          <a:blip r:embed="rId2"/>
-          <a:srcRect l="33467" t="16471" r="33239" b="16471"/>
-          <a:stretch/>
-        </p:blipFill>
-        <p:spPr>
-          <a:xfrm>
-            <a:off x="5050698" y="2125979"/>
-            <a:ext cx="2587752" cy="2606041"/>
-          </a:xfrm>
-          <a:prstGeom prst="rect">
-            <a:avLst/>
-          </a:prstGeom>
-        </p:spPr>
-      </p:pic>
-    </p:spTree>
-    <p:extLst>
-      <p:ext uri="{BB962C8B-B14F-4D97-AF65-F5344CB8AC3E}">
-        <p14:creationId xmlns:p14="http://schemas.microsoft.com/office/powerpoint/2010/main" val="273287833"/>
-      </p:ext>
-    </p:extLst>
-  </p:cSld>
-  <p:clrMapOvr>
-    <a:masterClrMapping/>
-  </p:clrMapOvr>
-</p:sld>
-</file>
-
-<file path=ppt/slides/slide4.xml><?xml version="1.0" encoding="utf-8"?>
-<p:sld xmlns:a="http://schemas.openxmlformats.org/drawingml/2006/main" xmlns:r="http://schemas.openxmlformats.org/officeDocument/2006/relationships" xmlns:p="http://schemas.openxmlformats.org/presentationml/2006/main">
-  <p:cSld>
-    <p:spTree>
-      <p:nvGrpSpPr>
-        <p:cNvPr id="1" name="">
-          <a:extLst>
-            <a:ext uri="{FF2B5EF4-FFF2-40B4-BE49-F238E27FC236}">
-              <a16:creationId xmlns:a16="http://schemas.microsoft.com/office/drawing/2014/main" id="{8B5A1316-A0CD-026F-E95D-3D41B198FEA6}"/>
-            </a:ext>
-          </a:extLst>
-        </p:cNvPr>
-        <p:cNvGrpSpPr/>
-        <p:nvPr/>
-      </p:nvGrpSpPr>
-      <p:grpSpPr>
-        <a:xfrm>
-          <a:off x="0" y="0"/>
-          <a:ext cx="0" cy="0"/>
-          <a:chOff x="0" y="0"/>
-          <a:chExt cx="0" cy="0"/>
-        </a:xfrm>
-      </p:grpSpPr>
-      <p:pic>
-        <p:nvPicPr>
-          <p:cNvPr id="8" name="Picture 7" descr="A map of a city&#10;&#10;AI-generated content may be incorrect.">
-            <a:extLst>
-              <a:ext uri="{FF2B5EF4-FFF2-40B4-BE49-F238E27FC236}">
-                <a16:creationId xmlns:a16="http://schemas.microsoft.com/office/drawing/2014/main" id="{A0063A42-BA01-5983-1BD3-85846D73D172}"/>
-              </a:ext>
-            </a:extLst>
-          </p:cNvPr>
-          <p:cNvPicPr>
-            <a:picLocks noChangeAspect="1"/>
-          </p:cNvPicPr>
-          <p:nvPr/>
-        </p:nvPicPr>
-        <p:blipFill>
-          <a:blip r:embed="rId2"/>
-          <a:srcRect l="31059" t="13979" r="35647" b="18961"/>
-          <a:stretch/>
-        </p:blipFill>
-        <p:spPr>
-          <a:xfrm>
-            <a:off x="2884544" y="1140558"/>
-            <a:ext cx="2587753" cy="2606041"/>
-          </a:xfrm>
-          <a:prstGeom prst="rect">
-            <a:avLst/>
-          </a:prstGeom>
-        </p:spPr>
-      </p:pic>
-    </p:spTree>
-    <p:extLst>
-      <p:ext uri="{BB962C8B-B14F-4D97-AF65-F5344CB8AC3E}">
-        <p14:creationId xmlns:p14="http://schemas.microsoft.com/office/powerpoint/2010/main" val="1033010967"/>
+        <p14:creationId xmlns:p14="http://schemas.microsoft.com/office/powerpoint/2010/main" val="2562009677"/>
       </p:ext>
     </p:extLst>
   </p:cSld>

</xml_diff>